<commit_message>
Update the week 9 presentation
</commit_message>
<xml_diff>
--- a/G4-wk09.pptx
+++ b/G4-wk09.pptx
@@ -1989,6 +1989,25 @@
           </a:bodyPr>
           <a:lstStyle/>
           <a:p>
+            <a:pPr indent="0" lvl="0" marL="0" rtl="0" algn="l">
+              <a:lnSpc>
+                <a:spcPct val="100000"/>
+              </a:lnSpc>
+              <a:spcBef>
+                <a:spcPts val="0"/>
+              </a:spcBef>
+              <a:spcAft>
+                <a:spcPts val="0"/>
+              </a:spcAft>
+              <a:buNone/>
+            </a:pPr>
+            <a:r>
+              <a:rPr lang="en-US"/>
+              <a:t>Joe</a:t>
+            </a:r>
+            <a:endParaRPr/>
+          </a:p>
+          <a:p>
             <a:pPr indent="-317500" lvl="0" marL="457200" rtl="0" algn="l">
               <a:lnSpc>
                 <a:spcPct val="100000"/>
@@ -2115,6 +2134,25 @@
           </a:bodyPr>
           <a:lstStyle/>
           <a:p>
+            <a:pPr indent="0" lvl="0" marL="0" rtl="0" algn="l">
+              <a:lnSpc>
+                <a:spcPct val="100000"/>
+              </a:lnSpc>
+              <a:spcBef>
+                <a:spcPts val="0"/>
+              </a:spcBef>
+              <a:spcAft>
+                <a:spcPts val="0"/>
+              </a:spcAft>
+              <a:buNone/>
+            </a:pPr>
+            <a:r>
+              <a:rPr lang="en-US"/>
+              <a:t>Joe</a:t>
+            </a:r>
+            <a:endParaRPr/>
+          </a:p>
+          <a:p>
             <a:pPr indent="-317500" lvl="0" marL="457200" rtl="0" algn="l">
               <a:lnSpc>
                 <a:spcPct val="100000"/>
@@ -2241,21 +2279,21 @@
           </a:bodyPr>
           <a:lstStyle/>
           <a:p>
-            <a:pPr indent="-317500" lvl="0" marL="457200" rtl="0" algn="l">
-              <a:lnSpc>
-                <a:spcPct val="100000"/>
-              </a:lnSpc>
-              <a:spcBef>
-                <a:spcPts val="0"/>
-              </a:spcBef>
-              <a:spcAft>
-                <a:spcPts val="0"/>
-              </a:spcAft>
-              <a:buSzPts val="1400"/>
-              <a:buAutoNum type="arabicPeriod"/>
+            <a:pPr indent="0" lvl="0" marL="0" rtl="0" algn="l">
+              <a:lnSpc>
+                <a:spcPct val="100000"/>
+              </a:lnSpc>
+              <a:spcBef>
+                <a:spcPts val="0"/>
+              </a:spcBef>
+              <a:spcAft>
+                <a:spcPts val="0"/>
+              </a:spcAft>
+              <a:buNone/>
             </a:pPr>
             <a:r>
-              <a:t/>
+              <a:rPr lang="en-US"/>
+              <a:t>Joe</a:t>
             </a:r>
             <a:endParaRPr/>
           </a:p>
@@ -2358,21 +2396,21 @@
           </a:bodyPr>
           <a:lstStyle/>
           <a:p>
-            <a:pPr indent="-317500" lvl="0" marL="457200" rtl="0" algn="l">
-              <a:lnSpc>
-                <a:spcPct val="100000"/>
-              </a:lnSpc>
-              <a:spcBef>
-                <a:spcPts val="0"/>
-              </a:spcBef>
-              <a:spcAft>
-                <a:spcPts val="0"/>
-              </a:spcAft>
-              <a:buSzPts val="1400"/>
-              <a:buAutoNum type="arabicPeriod"/>
+            <a:pPr indent="0" lvl="0" marL="0" rtl="0" algn="l">
+              <a:lnSpc>
+                <a:spcPct val="100000"/>
+              </a:lnSpc>
+              <a:spcBef>
+                <a:spcPts val="0"/>
+              </a:spcBef>
+              <a:spcAft>
+                <a:spcPts val="0"/>
+              </a:spcAft>
+              <a:buNone/>
             </a:pPr>
             <a:r>
-              <a:t/>
+              <a:rPr lang="en-US"/>
+              <a:t>Joe</a:t>
             </a:r>
             <a:endParaRPr/>
           </a:p>
@@ -2514,6 +2552,23 @@
                 <a:spcPts val="0"/>
               </a:spcAft>
               <a:buNone/>
+            </a:pPr>
+            <a:r>
+              <a:rPr lang="en-US"/>
+              <a:t>Joe</a:t>
+            </a:r>
+            <a:endParaRPr/>
+          </a:p>
+          <a:p>
+            <a:pPr indent="-317500" lvl="0" marL="457200" rtl="0" algn="l">
+              <a:spcBef>
+                <a:spcPts val="0"/>
+              </a:spcBef>
+              <a:spcAft>
+                <a:spcPts val="0"/>
+              </a:spcAft>
+              <a:buSzPts val="1400"/>
+              <a:buAutoNum type="arabicPeriod"/>
             </a:pPr>
             <a:r>
               <a:rPr lang="en-US"/>
@@ -10120,7 +10175,7 @@
             <a:tbl>
               <a:tblPr>
                 <a:noFill/>
-                <a:tableStyleId>{B06FF056-E9CC-47A0-87B5-18AAF2D93F46}</a:tableStyleId>
+                <a:tableStyleId>{24235E6E-FF39-4F6B-BC2C-5CF0E5BF9248}</a:tableStyleId>
               </a:tblPr>
               <a:tblGrid>
                 <a:gridCol w="2199050"/>

</xml_diff>